<commit_message>
Nieuwe functie die gebruikt maakt van sidecodes + poster 3 af + een paar kleine fixes Bijna altijd al > 0.7 voor categorie 1 en 2
</commit_message>
<xml_diff>
--- a/Posters/PosterWeek3T.pptx
+++ b/Posters/PosterWeek3T.pptx
@@ -373,7 +373,7 @@
             <a:fld id="{E3903A65-E77A-4CCE-9E24-496910D426DC}" type="datetimeFigureOut">
               <a:rPr lang="nl-NL" smtClean="0"/>
               <a:pPr/>
-              <a:t>15-1-2015</a:t>
+              <a:t>16-1-2015</a:t>
             </a:fld>
             <a:endParaRPr lang="nl-NL"/>
           </a:p>
@@ -986,7 +986,7 @@
             <a:fld id="{E3903A65-E77A-4CCE-9E24-496910D426DC}" type="datetimeFigureOut">
               <a:rPr lang="nl-NL" smtClean="0"/>
               <a:pPr/>
-              <a:t>15-1-2015</a:t>
+              <a:t>16-1-2015</a:t>
             </a:fld>
             <a:endParaRPr lang="nl-NL"/>
           </a:p>
@@ -1170,7 +1170,7 @@
             <a:fld id="{E3903A65-E77A-4CCE-9E24-496910D426DC}" type="datetimeFigureOut">
               <a:rPr lang="nl-NL" smtClean="0"/>
               <a:pPr/>
-              <a:t>15-1-2015</a:t>
+              <a:t>16-1-2015</a:t>
             </a:fld>
             <a:endParaRPr lang="nl-NL"/>
           </a:p>
@@ -1400,7 +1400,7 @@
             <a:fld id="{E3903A65-E77A-4CCE-9E24-496910D426DC}" type="datetimeFigureOut">
               <a:rPr lang="nl-NL" smtClean="0"/>
               <a:pPr/>
-              <a:t>15-1-2015</a:t>
+              <a:t>16-1-2015</a:t>
             </a:fld>
             <a:endParaRPr lang="nl-NL"/>
           </a:p>
@@ -1656,7 +1656,7 @@
             <a:fld id="{E3903A65-E77A-4CCE-9E24-496910D426DC}" type="datetimeFigureOut">
               <a:rPr lang="nl-NL" smtClean="0"/>
               <a:pPr/>
-              <a:t>15-1-2015</a:t>
+              <a:t>16-1-2015</a:t>
             </a:fld>
             <a:endParaRPr lang="nl-NL"/>
           </a:p>
@@ -1782,7 +1782,7 @@
             <a:fld id="{E3903A65-E77A-4CCE-9E24-496910D426DC}" type="datetimeFigureOut">
               <a:rPr lang="nl-NL" smtClean="0"/>
               <a:pPr/>
-              <a:t>15-1-2015</a:t>
+              <a:t>16-1-2015</a:t>
             </a:fld>
             <a:endParaRPr lang="nl-NL"/>
           </a:p>
@@ -2156,7 +2156,7 @@
             <a:fld id="{E3903A65-E77A-4CCE-9E24-496910D426DC}" type="datetimeFigureOut">
               <a:rPr lang="nl-NL" smtClean="0"/>
               <a:pPr/>
-              <a:t>15-1-2015</a:t>
+              <a:t>16-1-2015</a:t>
             </a:fld>
             <a:endParaRPr lang="nl-NL"/>
           </a:p>
@@ -2396,7 +2396,7 @@
             <a:fld id="{E3903A65-E77A-4CCE-9E24-496910D426DC}" type="datetimeFigureOut">
               <a:rPr lang="nl-NL" smtClean="0"/>
               <a:pPr/>
-              <a:t>15-1-2015</a:t>
+              <a:t>16-1-2015</a:t>
             </a:fld>
             <a:endParaRPr lang="nl-NL"/>
           </a:p>
@@ -2495,7 +2495,7 @@
             <a:fld id="{E3903A65-E77A-4CCE-9E24-496910D426DC}" type="datetimeFigureOut">
               <a:rPr lang="nl-NL" smtClean="0"/>
               <a:pPr/>
-              <a:t>15-1-2015</a:t>
+              <a:t>16-1-2015</a:t>
             </a:fld>
             <a:endParaRPr lang="nl-NL"/>
           </a:p>
@@ -2763,7 +2763,7 @@
             <a:fld id="{E3903A65-E77A-4CCE-9E24-496910D426DC}" type="datetimeFigureOut">
               <a:rPr lang="nl-NL" smtClean="0"/>
               <a:pPr/>
-              <a:t>15-1-2015</a:t>
+              <a:t>16-1-2015</a:t>
             </a:fld>
             <a:endParaRPr lang="nl-NL"/>
           </a:p>
@@ -3036,7 +3036,7 @@
             <a:fld id="{E3903A65-E77A-4CCE-9E24-496910D426DC}" type="datetimeFigureOut">
               <a:rPr lang="nl-NL" smtClean="0"/>
               <a:pPr/>
-              <a:t>15-1-2015</a:t>
+              <a:t>16-1-2015</a:t>
             </a:fld>
             <a:endParaRPr lang="nl-NL"/>
           </a:p>
@@ -3580,7 +3580,7 @@
             <a:fld id="{E3903A65-E77A-4CCE-9E24-496910D426DC}" type="datetimeFigureOut">
               <a:rPr lang="nl-NL" smtClean="0"/>
               <a:pPr/>
-              <a:t>15-1-2015</a:t>
+              <a:t>16-1-2015</a:t>
             </a:fld>
             <a:endParaRPr lang="nl-NL"/>
           </a:p>
@@ -4062,7 +4062,7 @@
         </p:style>
         <p:txBody>
           <a:bodyPr>
-            <a:normAutofit lnSpcReduction="10000"/>
+            <a:normAutofit fontScale="70000" lnSpcReduction="20000"/>
           </a:bodyPr>
           <a:lstStyle/>
           <a:p>
@@ -4070,27 +4070,53 @@
               <a:buNone/>
             </a:pPr>
             <a:r>
-              <a:rPr lang="nl-NL" sz="1500" b="1" dirty="0" smtClean="0"/>
-              <a:t>Tomas Heinsohn Huala</a:t>
-            </a:r>
-            <a:r>
-              <a:rPr lang="nl-NL" sz="1500" dirty="0" smtClean="0"/>
+              <a:rPr lang="nl-NL" sz="1600" b="1" dirty="0"/>
+              <a:t>Group: 9</a:t>
+            </a:r>
+          </a:p>
+          <a:p>
+            <a:pPr marL="0" indent="0" algn="ctr">
+              <a:buNone/>
+            </a:pPr>
+            <a:r>
+              <a:rPr lang="nl-NL" sz="1600" b="1" dirty="0"/>
+              <a:t>Tomas </a:t>
+            </a:r>
+            <a:r>
+              <a:rPr lang="nl-NL" sz="1600" b="1" dirty="0" err="1"/>
+              <a:t>Heinsohn</a:t>
+            </a:r>
+            <a:r>
+              <a:rPr lang="nl-NL" sz="1600" b="1" dirty="0"/>
+              <a:t> </a:t>
+            </a:r>
+            <a:r>
+              <a:rPr lang="nl-NL" sz="1600" b="1" dirty="0" err="1"/>
+              <a:t>Huala</a:t>
+            </a:r>
+            <a:r>
+              <a:rPr lang="nl-NL" sz="1600" dirty="0"/>
+              <a:t>	</a:t>
+            </a:r>
+            <a:r>
+              <a:rPr lang="nl-NL" sz="1600" dirty="0" smtClean="0"/>
               <a:t>	4326318</a:t>
             </a:r>
+            <a:endParaRPr lang="nl-NL" sz="1600" dirty="0"/>
           </a:p>
           <a:p>
             <a:pPr marL="0" indent="0" algn="ctr">
               <a:buNone/>
             </a:pPr>
             <a:r>
-              <a:rPr lang="nl-NL" sz="1500" b="1" dirty="0" smtClean="0"/>
+              <a:rPr lang="nl-NL" sz="1600" b="1" dirty="0"/>
               <a:t>Remi van der Laan	</a:t>
             </a:r>
             <a:r>
-              <a:rPr lang="nl-NL" sz="1500" dirty="0" smtClean="0"/>
+              <a:rPr lang="nl-NL" sz="1600" dirty="0"/>
               <a:t>	4326156</a:t>
             </a:r>
-            <a:endParaRPr lang="nl-NL" sz="1500" dirty="0"/>
+            <a:endParaRPr lang="nl-NL" sz="1600" dirty="0"/>
           </a:p>
         </p:txBody>
       </p:sp>
@@ -4132,6 +4158,34 @@
           <a:lstStyle/>
           <a:p>
             <a:pPr algn="ctr"/>
+            <a:r>
+              <a:rPr lang="nl-NL" sz="6400" dirty="0" smtClean="0">
+                <a:ln w="12700">
+                  <a:solidFill>
+                    <a:schemeClr val="tx2">
+                      <a:satMod val="155000"/>
+                    </a:schemeClr>
+                  </a:solidFill>
+                  <a:prstDash val="solid"/>
+                </a:ln>
+                <a:solidFill>
+                  <a:schemeClr val="bg2">
+                    <a:tint val="85000"/>
+                    <a:satMod val="155000"/>
+                  </a:schemeClr>
+                </a:solidFill>
+                <a:effectLst>
+                  <a:outerShdw blurRad="41275" dist="20320" dir="1800000" algn="tl" rotWithShape="0">
+                    <a:srgbClr val="000000">
+                      <a:alpha val="40000"/>
+                    </a:srgbClr>
+                  </a:outerShdw>
+                </a:effectLst>
+                <a:latin typeface="Baskerville Old Face" panose="02020602080505020303" pitchFamily="18" charset="0"/>
+                <a:cs typeface="Times New Roman" panose="02020603050405020304" pitchFamily="18" charset="0"/>
+              </a:rPr>
+              <a:t>License </a:t>
+            </a:r>
             <a:r>
               <a:rPr lang="nl-NL" sz="6400" dirty="0" err="1" smtClean="0">
                 <a:ln w="12700">
@@ -4158,7 +4212,7 @@
                 <a:latin typeface="Baskerville Old Face" panose="02020602080505020303" pitchFamily="18" charset="0"/>
                 <a:cs typeface="Times New Roman" panose="02020603050405020304" pitchFamily="18" charset="0"/>
               </a:rPr>
-              <a:t>Licence</a:t>
+              <a:t>Plate</a:t>
             </a:r>
             <a:r>
               <a:rPr lang="nl-NL" sz="6400" dirty="0" smtClean="0">
@@ -4214,62 +4268,6 @@
                 <a:latin typeface="Baskerville Old Face" panose="02020602080505020303" pitchFamily="18" charset="0"/>
                 <a:cs typeface="Times New Roman" panose="02020603050405020304" pitchFamily="18" charset="0"/>
               </a:rPr>
-              <a:t>Plate</a:t>
-            </a:r>
-            <a:r>
-              <a:rPr lang="nl-NL" sz="6400" dirty="0" smtClean="0">
-                <a:ln w="12700">
-                  <a:solidFill>
-                    <a:schemeClr val="tx2">
-                      <a:satMod val="155000"/>
-                    </a:schemeClr>
-                  </a:solidFill>
-                  <a:prstDash val="solid"/>
-                </a:ln>
-                <a:solidFill>
-                  <a:schemeClr val="bg2">
-                    <a:tint val="85000"/>
-                    <a:satMod val="155000"/>
-                  </a:schemeClr>
-                </a:solidFill>
-                <a:effectLst>
-                  <a:outerShdw blurRad="41275" dist="20320" dir="1800000" algn="tl" rotWithShape="0">
-                    <a:srgbClr val="000000">
-                      <a:alpha val="40000"/>
-                    </a:srgbClr>
-                  </a:outerShdw>
-                </a:effectLst>
-                <a:latin typeface="Baskerville Old Face" panose="02020602080505020303" pitchFamily="18" charset="0"/>
-                <a:cs typeface="Times New Roman" panose="02020603050405020304" pitchFamily="18" charset="0"/>
-              </a:rPr>
-              <a:t> </a:t>
-            </a:r>
-            <a:r>
-              <a:rPr lang="nl-NL" sz="6400" dirty="0" err="1" smtClean="0">
-                <a:ln w="12700">
-                  <a:solidFill>
-                    <a:schemeClr val="tx2">
-                      <a:satMod val="155000"/>
-                    </a:schemeClr>
-                  </a:solidFill>
-                  <a:prstDash val="solid"/>
-                </a:ln>
-                <a:solidFill>
-                  <a:schemeClr val="bg2">
-                    <a:tint val="85000"/>
-                    <a:satMod val="155000"/>
-                  </a:schemeClr>
-                </a:solidFill>
-                <a:effectLst>
-                  <a:outerShdw blurRad="41275" dist="20320" dir="1800000" algn="tl" rotWithShape="0">
-                    <a:srgbClr val="000000">
-                      <a:alpha val="40000"/>
-                    </a:srgbClr>
-                  </a:outerShdw>
-                </a:effectLst>
-                <a:latin typeface="Baskerville Old Face" panose="02020602080505020303" pitchFamily="18" charset="0"/>
-                <a:cs typeface="Times New Roman" panose="02020603050405020304" pitchFamily="18" charset="0"/>
-              </a:rPr>
               <a:t>Recognition</a:t>
             </a:r>
             <a:endParaRPr lang="nl-NL" sz="6400" dirty="0">
@@ -4326,7 +4324,7 @@
               <a:buNone/>
             </a:pPr>
             <a:r>
-              <a:rPr lang="en-US" sz="4300" dirty="0" smtClean="0">
+              <a:rPr lang="en-US" sz="4300" smtClean="0">
                 <a:ln w="10160">
                   <a:solidFill>
                     <a:schemeClr val="accent1"/>
@@ -4344,7 +4342,28 @@
                   </a:outerShdw>
                 </a:effectLst>
               </a:rPr>
-              <a:t>This iteration</a:t>
+              <a:t>This </a:t>
+            </a:r>
+            <a:r>
+              <a:rPr lang="en-US" sz="4300" smtClean="0">
+                <a:ln w="10160">
+                  <a:solidFill>
+                    <a:schemeClr val="accent1"/>
+                  </a:solidFill>
+                  <a:prstDash val="solid"/>
+                </a:ln>
+                <a:solidFill>
+                  <a:srgbClr val="FFFFFF"/>
+                </a:solidFill>
+                <a:effectLst>
+                  <a:outerShdw blurRad="38100" dist="32000" dir="5400000" algn="tl">
+                    <a:srgbClr val="000000">
+                      <a:alpha val="30000"/>
+                    </a:srgbClr>
+                  </a:outerShdw>
+                </a:effectLst>
+              </a:rPr>
+              <a:t>Iteration</a:t>
             </a:r>
             <a:endParaRPr lang="nl-NL" sz="4300" dirty="0" smtClean="0">
               <a:ln w="10160">
@@ -4432,13 +4451,40 @@
             </a:pPr>
             <a:r>
               <a:rPr lang="en-US" sz="1200" dirty="0" smtClean="0"/>
-              <a:t>Closer to the final deadline we tried to improve our program resulting in a better license plate detector with better results. This week we managed to improve several things. These are the little improvements:</a:t>
-            </a:r>
-          </a:p>
-          <a:p>
-            <a:pPr marL="0" indent="0">
-              <a:buNone/>
-            </a:pPr>
+              <a:t>We’re closing in on the </a:t>
+            </a:r>
+            <a:r>
+              <a:rPr lang="en-US" sz="1200" dirty="0" smtClean="0"/>
+              <a:t>final </a:t>
+            </a:r>
+            <a:r>
+              <a:rPr lang="en-US" sz="1200" dirty="0" smtClean="0"/>
+              <a:t>deadline, so for this iteration </a:t>
+            </a:r>
+            <a:r>
+              <a:rPr lang="en-US" sz="1200" dirty="0" smtClean="0"/>
+              <a:t>we </a:t>
+            </a:r>
+            <a:r>
+              <a:rPr lang="en-US" sz="1200" dirty="0" smtClean="0"/>
+              <a:t>focused on improving </a:t>
+            </a:r>
+            <a:r>
+              <a:rPr lang="en-US" sz="1200" dirty="0" smtClean="0"/>
+              <a:t>our program resulting in a better license plate detector with better </a:t>
+            </a:r>
+            <a:r>
+              <a:rPr lang="en-US" sz="1200" dirty="0" smtClean="0"/>
+              <a:t>results instead of adding new features. </a:t>
+            </a:r>
+            <a:r>
+              <a:rPr lang="en-US" sz="1200" dirty="0" smtClean="0"/>
+              <a:t>This week we managed to improve several things. </a:t>
+            </a:r>
+            <a:r>
+              <a:rPr lang="en-US" sz="1200" dirty="0" smtClean="0"/>
+              <a:t>This is a summary of our improvements:</a:t>
+            </a:r>
             <a:endParaRPr lang="en-US" sz="1200" dirty="0" smtClean="0"/>
           </a:p>
           <a:p>
@@ -4448,8 +4494,21 @@
             </a:pPr>
             <a:r>
               <a:rPr lang="en-US" sz="1200" dirty="0" smtClean="0"/>
-              <a:t> We improved the detection of the license plates</a:t>
-            </a:r>
+              <a:t> We improved the detection of </a:t>
+            </a:r>
+            <a:r>
+              <a:rPr lang="en-US" sz="1200" dirty="0" smtClean="0"/>
+              <a:t>where the </a:t>
+            </a:r>
+            <a:r>
+              <a:rPr lang="en-US" sz="1200" dirty="0" smtClean="0"/>
+              <a:t>license </a:t>
+            </a:r>
+            <a:r>
+              <a:rPr lang="en-US" sz="1200" dirty="0" smtClean="0"/>
+              <a:t>plates are located.</a:t>
+            </a:r>
+            <a:endParaRPr lang="en-US" sz="1200" dirty="0" smtClean="0"/>
           </a:p>
           <a:p>
             <a:pPr marL="0" indent="0">
@@ -4458,12 +4517,25 @@
             </a:pPr>
             <a:r>
               <a:rPr lang="en-US" sz="1200" dirty="0" smtClean="0"/>
-              <a:t> </a:t>
+              <a:t> We changed the output of the </a:t>
             </a:r>
             <a:r>
               <a:rPr lang="en-US" sz="1200" dirty="0" smtClean="0"/>
-              <a:t>We changed the output of the program so we get fewer results</a:t>
-            </a:r>
+              <a:t>recognized license plates </a:t>
+            </a:r>
+            <a:r>
+              <a:rPr lang="en-US" sz="1200" dirty="0" smtClean="0"/>
+              <a:t>so </a:t>
+            </a:r>
+            <a:r>
+              <a:rPr lang="en-US" sz="1200" dirty="0" smtClean="0"/>
+              <a:t>we get </a:t>
+            </a:r>
+            <a:r>
+              <a:rPr lang="en-US" sz="1200" dirty="0" smtClean="0"/>
+              <a:t>fewer and more accurate results in the table.</a:t>
+            </a:r>
+            <a:endParaRPr lang="en-US" sz="1200" dirty="0" smtClean="0"/>
           </a:p>
           <a:p>
             <a:pPr marL="0" indent="0">
@@ -4472,12 +4544,13 @@
             </a:pPr>
             <a:r>
               <a:rPr lang="en-US" sz="1200" dirty="0" smtClean="0"/>
-              <a:t> </a:t>
+              <a:t> We changed the </a:t>
             </a:r>
             <a:r>
               <a:rPr lang="en-US" sz="1200" dirty="0" smtClean="0"/>
-              <a:t>We changed the processing of the frames so we get the wanted detection speed.</a:t>
-            </a:r>
+              <a:t>amount of frames that are skipped to automatically get 1.3 times the total time of the video. </a:t>
+            </a:r>
+            <a:endParaRPr lang="en-US" sz="1200" dirty="0" smtClean="0"/>
           </a:p>
           <a:p>
             <a:pPr marL="0" indent="0">
@@ -4500,7 +4573,7 @@
         <p:spPr>
           <a:xfrm>
             <a:off x="5794824" y="3377262"/>
-            <a:ext cx="4814249" cy="8468141"/>
+            <a:ext cx="4814249" cy="6595933"/>
           </a:xfrm>
           <a:ln/>
         </p:spPr>
@@ -4527,7 +4600,164 @@
             <a:pPr marL="0" indent="0">
               <a:buNone/>
             </a:pPr>
-            <a:endParaRPr lang="nl-NL" sz="1500" dirty="0"/>
+            <a:r>
+              <a:rPr lang="en-US" sz="1200" dirty="0" smtClean="0"/>
+              <a:t>We improved the accuracy of the license plates shown in the table by counting which license plates are recognized more frequently. If the difference between a new recognized license plate has 3 or more </a:t>
+            </a:r>
+            <a:r>
+              <a:rPr lang="en-US" sz="1200" dirty="0"/>
+              <a:t>different </a:t>
+            </a:r>
+            <a:r>
+              <a:rPr lang="en-US" sz="1200" dirty="0" smtClean="0"/>
+              <a:t>characters, then we assume it’s a new license plate.</a:t>
+            </a:r>
+          </a:p>
+          <a:p>
+            <a:pPr marL="0" indent="0">
+              <a:buNone/>
+            </a:pPr>
+            <a:r>
+              <a:rPr lang="en-US" sz="1200" dirty="0" smtClean="0"/>
+              <a:t>Also, we first recognized the dashes by looking for small objects, but now we add them where the two largest gaps between characters are.</a:t>
+            </a:r>
+          </a:p>
+          <a:p>
+            <a:pPr marL="0" indent="0">
+              <a:buNone/>
+            </a:pPr>
+            <a:r>
+              <a:rPr lang="en-US" sz="1200" dirty="0" smtClean="0"/>
+              <a:t>Here is how our table used to look and how it looks now:</a:t>
+            </a:r>
+          </a:p>
+          <a:p>
+            <a:pPr marL="0" indent="0">
+              <a:buNone/>
+            </a:pPr>
+            <a:endParaRPr lang="en-US" sz="1200" dirty="0" smtClean="0"/>
+          </a:p>
+          <a:p>
+            <a:pPr marL="0" indent="0">
+              <a:buNone/>
+            </a:pPr>
+            <a:endParaRPr lang="en-US" sz="1200" dirty="0" smtClean="0"/>
+          </a:p>
+          <a:p>
+            <a:pPr marL="0" indent="0">
+              <a:buNone/>
+            </a:pPr>
+            <a:endParaRPr lang="en-US" sz="1200" dirty="0" smtClean="0"/>
+          </a:p>
+          <a:p>
+            <a:pPr marL="0" indent="0">
+              <a:buNone/>
+            </a:pPr>
+            <a:endParaRPr lang="en-US" sz="1200" dirty="0" smtClean="0"/>
+          </a:p>
+          <a:p>
+            <a:pPr marL="0" indent="0">
+              <a:buNone/>
+            </a:pPr>
+            <a:endParaRPr lang="en-US" sz="1200" dirty="0" smtClean="0"/>
+          </a:p>
+          <a:p>
+            <a:pPr marL="0" indent="0">
+              <a:buNone/>
+            </a:pPr>
+            <a:r>
+              <a:rPr lang="en-US" sz="1200" dirty="0" smtClean="0"/>
+              <a:t>Because of this, we were also able to compare our result with the answers of the training video:</a:t>
+            </a:r>
+          </a:p>
+          <a:p>
+            <a:pPr marL="0" indent="0">
+              <a:buNone/>
+            </a:pPr>
+            <a:endParaRPr lang="en-US" sz="1200" dirty="0" smtClean="0"/>
+          </a:p>
+          <a:p>
+            <a:pPr marL="0" indent="0">
+              <a:buNone/>
+            </a:pPr>
+            <a:endParaRPr lang="en-US" sz="1200" dirty="0" smtClean="0"/>
+          </a:p>
+          <a:p>
+            <a:pPr marL="0" indent="0">
+              <a:buNone/>
+            </a:pPr>
+            <a:endParaRPr lang="en-US" sz="1200" dirty="0" smtClean="0"/>
+          </a:p>
+          <a:p>
+            <a:pPr marL="0" indent="0">
+              <a:buNone/>
+            </a:pPr>
+            <a:endParaRPr lang="en-US" sz="1200" dirty="0" smtClean="0"/>
+          </a:p>
+          <a:p>
+            <a:pPr marL="0" indent="0">
+              <a:buNone/>
+            </a:pPr>
+            <a:endParaRPr lang="en-US" sz="1200" dirty="0" smtClean="0"/>
+          </a:p>
+          <a:p>
+            <a:pPr marL="0" indent="0">
+              <a:buNone/>
+            </a:pPr>
+            <a:endParaRPr lang="en-US" sz="1200" dirty="0" smtClean="0"/>
+          </a:p>
+          <a:p>
+            <a:pPr marL="0" indent="0">
+              <a:buNone/>
+            </a:pPr>
+            <a:endParaRPr lang="en-US" sz="1200" dirty="0" smtClean="0"/>
+          </a:p>
+          <a:p>
+            <a:pPr marL="0" indent="0">
+              <a:buNone/>
+            </a:pPr>
+            <a:endParaRPr lang="en-US" sz="1200" dirty="0" smtClean="0"/>
+          </a:p>
+          <a:p>
+            <a:pPr marL="0" indent="0">
+              <a:buNone/>
+            </a:pPr>
+            <a:endParaRPr lang="en-US" sz="1200" dirty="0" smtClean="0"/>
+          </a:p>
+          <a:p>
+            <a:pPr marL="0" indent="0">
+              <a:buNone/>
+            </a:pPr>
+            <a:endParaRPr lang="en-US" sz="1200" dirty="0" smtClean="0"/>
+          </a:p>
+          <a:p>
+            <a:pPr marL="0" indent="0">
+              <a:buNone/>
+            </a:pPr>
+            <a:endParaRPr lang="en-US" sz="1200" dirty="0" smtClean="0"/>
+          </a:p>
+          <a:p>
+            <a:pPr marL="0" indent="0">
+              <a:buNone/>
+            </a:pPr>
+            <a:r>
+              <a:rPr lang="en-US" sz="1200" dirty="0" smtClean="0"/>
+              <a:t>We lost a lot of points because characters like ‘8’ and ‘B’ are often mistaken for each other, which causes a lot of false positives and negatives. We are currently trying to solve this by recognizing which </a:t>
+            </a:r>
+            <a:r>
+              <a:rPr lang="en-US" sz="1200" dirty="0" err="1" smtClean="0"/>
+              <a:t>sidecode</a:t>
+            </a:r>
+            <a:r>
+              <a:rPr lang="en-US" sz="1200" dirty="0" smtClean="0"/>
+              <a:t> the license plate is using, and then converting these similar looking characters to the correct one. </a:t>
+            </a:r>
+          </a:p>
+          <a:p>
+            <a:pPr marL="0" indent="0">
+              <a:buNone/>
+            </a:pPr>
+            <a:endParaRPr lang="en-US" sz="1200" dirty="0"/>
           </a:p>
         </p:txBody>
       </p:sp>
@@ -4543,7 +4773,7 @@
         </p:nvSpPr>
         <p:spPr>
           <a:xfrm>
-            <a:off x="10909324" y="6228779"/>
+            <a:off x="10909323" y="6372795"/>
             <a:ext cx="4814249" cy="1008112"/>
           </a:xfrm>
         </p:spPr>
@@ -4640,19 +4870,18 @@
             </a:pPr>
             <a:r>
               <a:rPr lang="en-US" sz="1200" dirty="0" smtClean="0"/>
-              <a:t>This will be the last iteration till the final deadline. Now we want to fine tune our program so we are able to get enough good results from the license plate detector.  We can achieve this by adjust our results. Now we have the problem that the stripes in the license plate are not always on the right spot. For example:</a:t>
-            </a:r>
-          </a:p>
-          <a:p>
-            <a:pPr marL="0" indent="0">
-              <a:buNone/>
-            </a:pPr>
+              <a:t>This will be the last iteration till the final deadline. Now we want to fine tune our program so we are able to get enough good results from the license plate detector.  </a:t>
+            </a:r>
             <a:endParaRPr lang="en-US" sz="1200" dirty="0" smtClean="0"/>
           </a:p>
           <a:p>
             <a:pPr marL="0" indent="0">
               <a:buNone/>
             </a:pPr>
+            <a:r>
+              <a:rPr lang="en-US" sz="1200" dirty="0" smtClean="0"/>
+              <a:t>These are the problems which we plan to fix in the next couple of days:</a:t>
+            </a:r>
             <a:endParaRPr lang="en-US" sz="1200" dirty="0" smtClean="0"/>
           </a:p>
           <a:p>
@@ -4661,17 +4890,60 @@
             </a:pPr>
             <a:r>
               <a:rPr lang="en-US" sz="1200" dirty="0" smtClean="0"/>
-              <a:t>An other problem is the fact that our system still has problems with detecting some of the license plates. </a:t>
-            </a:r>
-          </a:p>
-          <a:p>
-            <a:pPr marL="0" indent="0">
-              <a:buNone/>
-            </a:pPr>
+              <a:t>- An import problem is </a:t>
+            </a:r>
             <a:r>
               <a:rPr lang="en-US" sz="1200" dirty="0" smtClean="0"/>
-              <a:t>For next week we want to change these things. We also want to change the fact that in the results it should not be possible to place a digit next to a letter and vice versa.  We could also implement some standard license plate formats so we can fit our results in those standards. The last thing we should create next week is the final poster which gives a view of our final product.</a:t>
-            </a:r>
+              <a:t>the fact that our system still has problems with detecting some of the license </a:t>
+            </a:r>
+            <a:r>
+              <a:rPr lang="en-US" sz="1200" dirty="0" smtClean="0"/>
+              <a:t>plates</a:t>
+            </a:r>
+            <a:r>
+              <a:rPr lang="en-US" sz="1200" dirty="0" smtClean="0"/>
+              <a:t>, with bright yellow or white cars for example. </a:t>
+            </a:r>
+            <a:endParaRPr lang="en-US" sz="1200" dirty="0" smtClean="0"/>
+          </a:p>
+          <a:p>
+            <a:pPr marL="0" indent="0">
+              <a:buNone/>
+            </a:pPr>
+            <a:r>
+              <a:rPr lang="en-US" sz="1200" dirty="0" smtClean="0"/>
+              <a:t>- We </a:t>
+            </a:r>
+            <a:r>
+              <a:rPr lang="en-US" sz="1200" dirty="0" smtClean="0"/>
+              <a:t>also want to change the fact that in the results it should not be possible to place a digit next to a letter and vice versa. </a:t>
+            </a:r>
+            <a:r>
+              <a:rPr lang="en-US" sz="1200" dirty="0" smtClean="0"/>
+              <a:t>We’ve starting implementing this </a:t>
+            </a:r>
+            <a:r>
+              <a:rPr lang="en-US" sz="1200" dirty="0" smtClean="0"/>
+              <a:t>with the help of the standard </a:t>
+            </a:r>
+            <a:r>
+              <a:rPr lang="en-US" sz="1200" dirty="0" err="1" smtClean="0"/>
+              <a:t>sidecodes</a:t>
+            </a:r>
+            <a:r>
+              <a:rPr lang="en-US" sz="1200" dirty="0" smtClean="0"/>
+              <a:t>, but we haven’t finished implementing it yet.</a:t>
+            </a:r>
+          </a:p>
+          <a:p>
+            <a:pPr marL="0" indent="0">
+              <a:buNone/>
+            </a:pPr>
+            <a:r>
+              <a:rPr lang="en-US" sz="1200" dirty="0" smtClean="0"/>
+              <a:t>Lastly, we also want to spend a good amount of time on creating the last poster, because this should give anyone a good understanding of how our product works and which problems we had to overcome.</a:t>
+            </a:r>
+            <a:endParaRPr lang="en-US" sz="1200" dirty="0" smtClean="0"/>
           </a:p>
           <a:p>
             <a:pPr marL="0" indent="0">
@@ -4699,7 +4971,7 @@
           <a:blip r:embed="rId2" cstate="print">
             <a:extLst>
               <a:ext uri="{28A0092B-C50C-407E-A947-70E740481C1C}">
-                <a14:useLocalDpi xmlns:a14="http://schemas.microsoft.com/office/drawing/2010/main" xmlns="" val="0"/>
+                <a14:useLocalDpi xmlns:a14="http://schemas.microsoft.com/office/drawing/2010/main" val="0"/>
               </a:ext>
             </a:extLst>
           </a:blip>
@@ -4719,7 +4991,7 @@
           <a:noFill/>
           <a:extLst>
             <a:ext uri="{909E8E84-426E-40DD-AFC4-6F175D3DCCD1}">
-              <a14:hiddenFill xmlns:a14="http://schemas.microsoft.com/office/drawing/2010/main" xmlns="">
+              <a14:hiddenFill xmlns:a14="http://schemas.microsoft.com/office/drawing/2010/main">
                 <a:solidFill>
                   <a:srgbClr val="FFFFFF"/>
                 </a:solidFill>
@@ -5292,17 +5564,15 @@
           </p:cNvPicPr>
           <p:nvPr/>
         </p:nvPicPr>
-        <p:blipFill>
+        <p:blipFill rotWithShape="1">
           <a:blip r:embed="rId4" cstate="print"/>
-          <a:srcRect/>
-          <a:stretch>
-            <a:fillRect/>
-          </a:stretch>
+          <a:srcRect b="76012"/>
+          <a:stretch/>
         </p:blipFill>
         <p:spPr bwMode="auto">
           <a:xfrm>
-            <a:off x="5868764" y="3924524"/>
-            <a:ext cx="2590800" cy="4248472"/>
+            <a:off x="5818500" y="4860627"/>
+            <a:ext cx="2552526" cy="1004081"/>
           </a:xfrm>
           <a:prstGeom prst="rect">
             <a:avLst/>
@@ -5319,14 +5589,20 @@
       </p:pic>
       <p:pic>
         <p:nvPicPr>
-          <p:cNvPr id="1028" name="Picture 4"/>
+          <p:cNvPr id="5" name="Picture 2" descr="http://puu.sh/eB9wv/8de6e02e75.png"/>
           <p:cNvPicPr>
             <a:picLocks noChangeAspect="1" noChangeArrowheads="1"/>
           </p:cNvPicPr>
           <p:nvPr/>
         </p:nvPicPr>
         <p:blipFill>
-          <a:blip r:embed="rId5" cstate="print"/>
+          <a:blip r:embed="rId5">
+            <a:extLst>
+              <a:ext uri="{28A0092B-C50C-407E-A947-70E740481C1C}">
+                <a14:useLocalDpi xmlns:a14="http://schemas.microsoft.com/office/drawing/2010/main" val="0"/>
+              </a:ext>
+            </a:extLst>
+          </a:blip>
           <a:srcRect/>
           <a:stretch>
             <a:fillRect/>
@@ -5334,26 +5610,365 @@
         </p:blipFill>
         <p:spPr bwMode="auto">
           <a:xfrm>
-            <a:off x="11053340" y="8317011"/>
-            <a:ext cx="4275475" cy="360040"/>
+            <a:off x="8238387" y="4860627"/>
+            <a:ext cx="2370745" cy="1004081"/>
           </a:xfrm>
           <a:prstGeom prst="rect">
             <a:avLst/>
           </a:prstGeom>
           <a:noFill/>
-          <a:ln w="9525">
-            <a:noFill/>
-            <a:miter lim="800000"/>
-            <a:headEnd/>
-            <a:tailEnd/>
-          </a:ln>
-          <a:effectLst/>
+          <a:extLst>
+            <a:ext uri="{909E8E84-426E-40DD-AFC4-6F175D3DCCD1}">
+              <a14:hiddenFill xmlns:a14="http://schemas.microsoft.com/office/drawing/2010/main">
+                <a:solidFill>
+                  <a:srgbClr val="FFFFFF"/>
+                </a:solidFill>
+              </a14:hiddenFill>
+            </a:ext>
+          </a:extLst>
+        </p:spPr>
+      </p:pic>
+      <p:pic>
+        <p:nvPicPr>
+          <p:cNvPr id="23" name="Picture 2" descr="http://puu.sh/ey95j/054bd241de.png"/>
+          <p:cNvPicPr>
+            <a:picLocks noChangeAspect="1" noChangeArrowheads="1"/>
+          </p:cNvPicPr>
+          <p:nvPr/>
+        </p:nvPicPr>
+        <p:blipFill>
+          <a:blip r:embed="rId6">
+            <a:extLst>
+              <a:ext uri="{28A0092B-C50C-407E-A947-70E740481C1C}">
+                <a14:useLocalDpi xmlns:a14="http://schemas.microsoft.com/office/drawing/2010/main" val="0"/>
+              </a:ext>
+            </a:extLst>
+          </a:blip>
+          <a:srcRect/>
+          <a:stretch>
+            <a:fillRect/>
+          </a:stretch>
+        </p:blipFill>
+        <p:spPr bwMode="auto">
+          <a:xfrm>
+            <a:off x="5826092" y="6372795"/>
+            <a:ext cx="4773269" cy="2211804"/>
+          </a:xfrm>
+          <a:prstGeom prst="rect">
+            <a:avLst/>
+          </a:prstGeom>
+          <a:noFill/>
+          <a:extLst>
+            <a:ext uri="{909E8E84-426E-40DD-AFC4-6F175D3DCCD1}">
+              <a14:hiddenFill xmlns:a14="http://schemas.microsoft.com/office/drawing/2010/main">
+                <a:solidFill>
+                  <a:srgbClr val="FFFFFF"/>
+                </a:solidFill>
+              </a14:hiddenFill>
+            </a:ext>
+          </a:extLst>
+        </p:spPr>
+      </p:pic>
+      <p:sp>
+        <p:nvSpPr>
+          <p:cNvPr id="26" name="Ondertitel 2"/>
+          <p:cNvSpPr>
+            <a:spLocks noGrp="1"/>
+          </p:cNvSpPr>
+          <p:nvPr>
+            <p:ph sz="quarter" idx="13"/>
+          </p:nvPr>
+        </p:nvSpPr>
+        <p:spPr>
+          <a:xfrm>
+            <a:off x="10909323" y="1836291"/>
+            <a:ext cx="4814249" cy="1008112"/>
+          </a:xfrm>
+        </p:spPr>
+        <p:txBody>
+          <a:bodyPr>
+            <a:normAutofit fontScale="92500"/>
+          </a:bodyPr>
+          <a:lstStyle/>
+          <a:p>
+            <a:pPr marL="0" indent="0">
+              <a:buNone/>
+            </a:pPr>
+            <a:r>
+              <a:rPr lang="en-US" sz="4300" dirty="0" smtClean="0">
+                <a:ln w="10160">
+                  <a:solidFill>
+                    <a:schemeClr val="accent1"/>
+                  </a:solidFill>
+                  <a:prstDash val="solid"/>
+                </a:ln>
+                <a:solidFill>
+                  <a:srgbClr val="FFFFFF"/>
+                </a:solidFill>
+                <a:effectLst>
+                  <a:outerShdw blurRad="38100" dist="32000" dir="5400000" algn="tl">
+                    <a:srgbClr val="000000">
+                      <a:alpha val="30000"/>
+                    </a:srgbClr>
+                  </a:outerShdw>
+                </a:effectLst>
+              </a:rPr>
+              <a:t>Other Improvements</a:t>
+            </a:r>
+            <a:endParaRPr lang="nl-NL" sz="4300" dirty="0">
+              <a:ln w="10160">
+                <a:solidFill>
+                  <a:schemeClr val="accent1"/>
+                </a:solidFill>
+                <a:prstDash val="solid"/>
+              </a:ln>
+              <a:solidFill>
+                <a:srgbClr val="FFFFFF"/>
+              </a:solidFill>
+              <a:effectLst>
+                <a:outerShdw blurRad="38100" dist="32000" dir="5400000" algn="tl">
+                  <a:srgbClr val="000000">
+                    <a:alpha val="30000"/>
+                  </a:srgbClr>
+                </a:outerShdw>
+              </a:effectLst>
+            </a:endParaRPr>
+          </a:p>
+        </p:txBody>
+      </p:sp>
+      <p:sp>
+        <p:nvSpPr>
+          <p:cNvPr id="27" name="Ondertitel 2"/>
+          <p:cNvSpPr>
+            <a:spLocks noGrp="1"/>
+          </p:cNvSpPr>
+          <p:nvPr>
+            <p:ph sz="quarter" idx="13"/>
+          </p:nvPr>
+        </p:nvSpPr>
+        <p:spPr>
+          <a:xfrm>
+            <a:off x="10909324" y="2700387"/>
+            <a:ext cx="4814249" cy="3672408"/>
+          </a:xfrm>
+          <a:ln/>
+        </p:spPr>
+        <p:style>
+          <a:lnRef idx="2">
+            <a:schemeClr val="accent2"/>
+          </a:lnRef>
+          <a:fillRef idx="1">
+            <a:schemeClr val="lt1"/>
+          </a:fillRef>
+          <a:effectRef idx="0">
+            <a:schemeClr val="accent2"/>
+          </a:effectRef>
+          <a:fontRef idx="minor">
+            <a:schemeClr val="dk1"/>
+          </a:fontRef>
+        </p:style>
+        <p:txBody>
+          <a:bodyPr>
+            <a:normAutofit/>
+          </a:bodyPr>
+          <a:lstStyle/>
+          <a:p>
+            <a:pPr marL="0" indent="0">
+              <a:buNone/>
+            </a:pPr>
+            <a:r>
+              <a:rPr lang="en-US" sz="1200" dirty="0" smtClean="0"/>
+              <a:t>We’ve now automated the amount of frames that are skipped so our processing time does not exceed 1.3 times the time of the video. The amount of frames that is skipped mostly fluctuates between 1 and 5.</a:t>
+            </a:r>
+          </a:p>
+          <a:p>
+            <a:pPr marL="0" indent="0">
+              <a:buNone/>
+            </a:pPr>
+            <a:endParaRPr lang="en-US" sz="1200" dirty="0"/>
+          </a:p>
+          <a:p>
+            <a:pPr marL="0" indent="0">
+              <a:buNone/>
+            </a:pPr>
+            <a:r>
+              <a:rPr lang="en-US" sz="1200" dirty="0" smtClean="0"/>
+              <a:t>We’re now also using sharpening to improve the separation of the license plate with the characters, which </a:t>
+            </a:r>
+            <a:r>
+              <a:rPr lang="en-US" sz="1200" dirty="0" smtClean="0"/>
+              <a:t>helped to improve the accuracy of the character recognition. T</a:t>
+            </a:r>
+            <a:r>
+              <a:rPr lang="en-US" sz="1200" dirty="0" smtClean="0"/>
+              <a:t>his is how the original and the  sharpened image looks:</a:t>
+            </a:r>
+            <a:endParaRPr lang="nl-NL" sz="1200" dirty="0" smtClean="0"/>
+          </a:p>
+          <a:p>
+            <a:pPr marL="0" indent="0">
+              <a:buNone/>
+            </a:pPr>
+            <a:r>
+              <a:rPr lang="en-US" sz="1200" dirty="0" smtClean="0"/>
+              <a:t>	</a:t>
+            </a:r>
+            <a:r>
+              <a:rPr lang="en-US" sz="1200" i="1" dirty="0" smtClean="0"/>
+              <a:t>Without sharpening:</a:t>
+            </a:r>
+          </a:p>
+          <a:p>
+            <a:pPr marL="0" indent="0">
+              <a:buNone/>
+            </a:pPr>
+            <a:endParaRPr lang="en-US" sz="1200" i="1" dirty="0"/>
+          </a:p>
+          <a:p>
+            <a:pPr marL="0" indent="0">
+              <a:buNone/>
+            </a:pPr>
+            <a:endParaRPr lang="en-US" sz="1200" i="1" dirty="0" smtClean="0"/>
+          </a:p>
+          <a:p>
+            <a:pPr marL="0" indent="0">
+              <a:buNone/>
+            </a:pPr>
+            <a:endParaRPr lang="en-US" sz="1200" i="1" dirty="0"/>
+          </a:p>
+          <a:p>
+            <a:pPr marL="0" indent="0">
+              <a:buNone/>
+            </a:pPr>
+            <a:r>
+              <a:rPr lang="en-US" sz="1200" i="1" dirty="0" smtClean="0"/>
+              <a:t>	</a:t>
+            </a:r>
+            <a:r>
+              <a:rPr lang="en-US" sz="1200" i="1" dirty="0" smtClean="0"/>
+              <a:t>With sharpening:</a:t>
+            </a:r>
+            <a:endParaRPr lang="en-US" sz="1200" dirty="0" smtClean="0"/>
+          </a:p>
+        </p:txBody>
+      </p:sp>
+      <p:cxnSp>
+        <p:nvCxnSpPr>
+          <p:cNvPr id="28" name="Rechte verbindingslijn 27"/>
+          <p:cNvCxnSpPr/>
+          <p:nvPr/>
+        </p:nvCxnSpPr>
+        <p:spPr>
+          <a:xfrm>
+            <a:off x="10909324" y="2700387"/>
+            <a:ext cx="4814249" cy="0"/>
+          </a:xfrm>
+          <a:prstGeom prst="line">
+            <a:avLst/>
+          </a:prstGeom>
+          <a:ln w="76200"/>
+        </p:spPr>
+        <p:style>
+          <a:lnRef idx="1">
+            <a:schemeClr val="accent1"/>
+          </a:lnRef>
+          <a:fillRef idx="0">
+            <a:schemeClr val="accent1"/>
+          </a:fillRef>
+          <a:effectRef idx="0">
+            <a:schemeClr val="accent1"/>
+          </a:effectRef>
+          <a:fontRef idx="minor">
+            <a:schemeClr val="tx1"/>
+          </a:fontRef>
+        </p:style>
+      </p:cxnSp>
+      <p:pic>
+        <p:nvPicPr>
+          <p:cNvPr id="1029" name="Picture 5" descr="http://puu.sh/eBdkF/acb39a9e16.jpg"/>
+          <p:cNvPicPr>
+            <a:picLocks noChangeAspect="1" noChangeArrowheads="1"/>
+          </p:cNvPicPr>
+          <p:nvPr/>
+        </p:nvPicPr>
+        <p:blipFill>
+          <a:blip r:embed="rId7">
+            <a:extLst>
+              <a:ext uri="{28A0092B-C50C-407E-A947-70E740481C1C}">
+                <a14:useLocalDpi xmlns:a14="http://schemas.microsoft.com/office/drawing/2010/main" val="0"/>
+              </a:ext>
+            </a:extLst>
+          </a:blip>
+          <a:srcRect/>
+          <a:stretch>
+            <a:fillRect/>
+          </a:stretch>
+        </p:blipFill>
+        <p:spPr bwMode="auto">
+          <a:xfrm>
+            <a:off x="12040098" y="4593927"/>
+            <a:ext cx="2552700" cy="533400"/>
+          </a:xfrm>
+          <a:prstGeom prst="rect">
+            <a:avLst/>
+          </a:prstGeom>
+          <a:noFill/>
+          <a:extLst>
+            <a:ext uri="{909E8E84-426E-40DD-AFC4-6F175D3DCCD1}">
+              <a14:hiddenFill xmlns:a14="http://schemas.microsoft.com/office/drawing/2010/main">
+                <a:solidFill>
+                  <a:srgbClr val="FFFFFF"/>
+                </a:solidFill>
+              </a14:hiddenFill>
+            </a:ext>
+          </a:extLst>
+        </p:spPr>
+      </p:pic>
+      <p:pic>
+        <p:nvPicPr>
+          <p:cNvPr id="1031" name="Picture 7" descr="http://puu.sh/eBdqf/063de46c95.jpg"/>
+          <p:cNvPicPr>
+            <a:picLocks noChangeAspect="1" noChangeArrowheads="1"/>
+          </p:cNvPicPr>
+          <p:nvPr/>
+        </p:nvPicPr>
+        <p:blipFill>
+          <a:blip r:embed="rId8">
+            <a:extLst>
+              <a:ext uri="{28A0092B-C50C-407E-A947-70E740481C1C}">
+                <a14:useLocalDpi xmlns:a14="http://schemas.microsoft.com/office/drawing/2010/main" val="0"/>
+              </a:ext>
+            </a:extLst>
+          </a:blip>
+          <a:srcRect/>
+          <a:stretch>
+            <a:fillRect/>
+          </a:stretch>
+        </p:blipFill>
+        <p:spPr bwMode="auto">
+          <a:xfrm>
+            <a:off x="12040098" y="5508699"/>
+            <a:ext cx="2552700" cy="523875"/>
+          </a:xfrm>
+          <a:prstGeom prst="rect">
+            <a:avLst/>
+          </a:prstGeom>
+          <a:noFill/>
+          <a:extLst>
+            <a:ext uri="{909E8E84-426E-40DD-AFC4-6F175D3DCCD1}">
+              <a14:hiddenFill xmlns:a14="http://schemas.microsoft.com/office/drawing/2010/main">
+                <a:solidFill>
+                  <a:srgbClr val="FFFFFF"/>
+                </a:solidFill>
+              </a14:hiddenFill>
+            </a:ext>
+          </a:extLst>
         </p:spPr>
       </p:pic>
     </p:spTree>
     <p:extLst>
       <p:ext uri="{BB962C8B-B14F-4D97-AF65-F5344CB8AC3E}">
-        <p14:creationId xmlns:p14="http://schemas.microsoft.com/office/powerpoint/2010/main" xmlns="" val="2651525738"/>
+        <p14:creationId xmlns:p14="http://schemas.microsoft.com/office/powerpoint/2010/main" val="2651525738"/>
       </p:ext>
     </p:extLst>
   </p:cSld>

</xml_diff>